<commit_message>
Updated Visio and PPTX
</commit_message>
<xml_diff>
--- a/Instructions/CaseStudy/media/Az305 Scenario Presentation Example.pptx
+++ b/Instructions/CaseStudy/media/Az305 Scenario Presentation Example.pptx
@@ -1112,7 +1112,7 @@
           <a:p>
             <a:fld id="{C764DE79-268F-4C1A-8933-263129D2AF90}" type="datetimeFigureOut">
               <a:rPr lang="en-US" dirty="0"/>
-              <a:t>11/3/2022</a:t>
+              <a:t>3/17/2023</a:t>
             </a:fld>
             <a:endParaRPr lang="en-US" dirty="0"/>
           </a:p>
@@ -1280,7 +1280,7 @@
           <a:p>
             <a:fld id="{C764DE79-268F-4C1A-8933-263129D2AF90}" type="datetimeFigureOut">
               <a:rPr lang="en-US" dirty="0"/>
-              <a:t>11/3/2022</a:t>
+              <a:t>3/17/2023</a:t>
             </a:fld>
             <a:endParaRPr lang="en-US" dirty="0"/>
           </a:p>
@@ -1458,7 +1458,7 @@
           <a:p>
             <a:fld id="{C764DE79-268F-4C1A-8933-263129D2AF90}" type="datetimeFigureOut">
               <a:rPr lang="en-US" dirty="0"/>
-              <a:t>11/3/2022</a:t>
+              <a:t>3/17/2023</a:t>
             </a:fld>
             <a:endParaRPr lang="en-US" dirty="0"/>
           </a:p>
@@ -1626,7 +1626,7 @@
           <a:p>
             <a:fld id="{C764DE79-268F-4C1A-8933-263129D2AF90}" type="datetimeFigureOut">
               <a:rPr lang="en-US" dirty="0"/>
-              <a:t>11/3/2022</a:t>
+              <a:t>3/17/2023</a:t>
             </a:fld>
             <a:endParaRPr lang="en-US" dirty="0"/>
           </a:p>
@@ -1871,7 +1871,7 @@
           <a:p>
             <a:fld id="{C764DE79-268F-4C1A-8933-263129D2AF90}" type="datetimeFigureOut">
               <a:rPr lang="en-US" dirty="0"/>
-              <a:t>11/3/2022</a:t>
+              <a:t>3/17/2023</a:t>
             </a:fld>
             <a:endParaRPr lang="en-US" dirty="0"/>
           </a:p>
@@ -2100,7 +2100,7 @@
           <a:p>
             <a:fld id="{C764DE79-268F-4C1A-8933-263129D2AF90}" type="datetimeFigureOut">
               <a:rPr lang="en-US" dirty="0"/>
-              <a:t>11/3/2022</a:t>
+              <a:t>3/17/2023</a:t>
             </a:fld>
             <a:endParaRPr lang="en-US" dirty="0"/>
           </a:p>
@@ -2464,7 +2464,7 @@
           <a:p>
             <a:fld id="{C764DE79-268F-4C1A-8933-263129D2AF90}" type="datetimeFigureOut">
               <a:rPr lang="en-US" dirty="0"/>
-              <a:t>11/3/2022</a:t>
+              <a:t>3/17/2023</a:t>
             </a:fld>
             <a:endParaRPr lang="en-US" dirty="0"/>
           </a:p>
@@ -2581,7 +2581,7 @@
           <a:p>
             <a:fld id="{C764DE79-268F-4C1A-8933-263129D2AF90}" type="datetimeFigureOut">
               <a:rPr lang="en-US" dirty="0"/>
-              <a:t>11/3/2022</a:t>
+              <a:t>3/17/2023</a:t>
             </a:fld>
             <a:endParaRPr lang="en-US" dirty="0"/>
           </a:p>
@@ -2676,7 +2676,7 @@
           <a:p>
             <a:fld id="{C764DE79-268F-4C1A-8933-263129D2AF90}" type="datetimeFigureOut">
               <a:rPr lang="en-US" dirty="0"/>
-              <a:t>11/3/2022</a:t>
+              <a:t>3/17/2023</a:t>
             </a:fld>
             <a:endParaRPr lang="en-US" dirty="0"/>
           </a:p>
@@ -2951,7 +2951,7 @@
           <a:p>
             <a:fld id="{C764DE79-268F-4C1A-8933-263129D2AF90}" type="datetimeFigureOut">
               <a:rPr lang="en-US" dirty="0"/>
-              <a:t>11/3/2022</a:t>
+              <a:t>3/17/2023</a:t>
             </a:fld>
             <a:endParaRPr lang="en-US" dirty="0"/>
           </a:p>
@@ -3203,7 +3203,7 @@
           <a:p>
             <a:fld id="{C764DE79-268F-4C1A-8933-263129D2AF90}" type="datetimeFigureOut">
               <a:rPr lang="en-US" dirty="0"/>
-              <a:t>11/3/2022</a:t>
+              <a:t>3/17/2023</a:t>
             </a:fld>
             <a:endParaRPr lang="en-US" dirty="0"/>
           </a:p>
@@ -3414,7 +3414,7 @@
           <a:p>
             <a:fld id="{C764DE79-268F-4C1A-8933-263129D2AF90}" type="datetimeFigureOut">
               <a:rPr lang="en-US" dirty="0"/>
-              <a:t>11/3/2022</a:t>
+              <a:t>3/17/2023</a:t>
             </a:fld>
             <a:endParaRPr lang="en-US" dirty="0"/>
           </a:p>
@@ -11000,24 +11000,30 @@
         </p:spPr>
         <p:txBody>
           <a:bodyPr>
-            <a:normAutofit fontScale="85000" lnSpcReduction="10000"/>
+            <a:normAutofit fontScale="85000" lnSpcReduction="20000"/>
           </a:bodyPr>
           <a:lstStyle/>
           <a:p>
             <a:r>
-              <a:rPr lang="en-US" sz="2400" dirty="0"/>
+              <a:rPr lang="en-US" sz="2400"/>
               <a:t>Application activity will be streamed to Azure Event Hub for message queueing with a private endpoint to remove public access.</a:t>
             </a:r>
           </a:p>
           <a:p>
             <a:r>
-              <a:rPr lang="en-US" sz="2400" dirty="0"/>
+              <a:rPr lang="en-US" sz="2400"/>
+              <a:t>Azure Stream Analytics will be used to ingest the events from the web front end Event Hub and moved to the SQL database.</a:t>
+            </a:r>
+          </a:p>
+          <a:p>
+            <a:r>
+              <a:rPr lang="en-US" sz="2400"/>
               <a:t>A dedicated Event Hub instance will be provisioned to meet dedicated host requirements. Also offers better performance and cost at high work loads.</a:t>
             </a:r>
           </a:p>
           <a:p>
             <a:r>
-              <a:rPr lang="en-US" sz="2400" dirty="0"/>
+              <a:rPr lang="en-US" sz="2400"/>
               <a:t>Short term session caching will be held in Azure Cache for Redis P1 premium tier with six gigabytes of cache. Premium provides enhanced security and network isolation.</a:t>
             </a:r>
           </a:p>
@@ -11028,10 +11034,10 @@
       </p:sp>
       <p:pic>
         <p:nvPicPr>
-          <p:cNvPr id="4" name="Picture 3">
+          <p:cNvPr id="6" name="Picture 5">
             <a:extLst>
               <a:ext uri="{FF2B5EF4-FFF2-40B4-BE49-F238E27FC236}">
-                <a16:creationId xmlns:a16="http://schemas.microsoft.com/office/drawing/2014/main" id="{358D24AA-C803-4792-97A2-6C95B080995E}"/>
+                <a16:creationId xmlns:a16="http://schemas.microsoft.com/office/drawing/2014/main" id="{C14971C3-13B5-FE32-9A9D-852892A78018}"/>
               </a:ext>
             </a:extLst>
           </p:cNvPr>
@@ -11040,15 +11046,16 @@
           </p:cNvPicPr>
           <p:nvPr/>
         </p:nvPicPr>
-        <p:blipFill rotWithShape="1">
+        <p:blipFill>
           <a:blip r:embed="rId2"/>
-          <a:srcRect r="7682"/>
-          <a:stretch/>
+          <a:stretch>
+            <a:fillRect/>
+          </a:stretch>
         </p:blipFill>
         <p:spPr>
           <a:xfrm>
-            <a:off x="6098892" y="2492376"/>
-            <a:ext cx="4802404" cy="3563372"/>
+            <a:off x="6239868" y="2350575"/>
+            <a:ext cx="4859312" cy="3801181"/>
           </a:xfrm>
           <a:prstGeom prst="rect">
             <a:avLst/>

</xml_diff>